<commit_message>
update slides for secure deployment
</commit_message>
<xml_diff>
--- a/adb4u/secure-deployments/SecureDeployments.pptx
+++ b/adb4u/secure-deployments/SecureDeployments.pptx
@@ -7040,7 +7040,7 @@
             <a:tbl>
               <a:tblPr>
                 <a:noFill/>
-                <a:tableStyleId>{E0BCCB88-228C-4BD8-B077-F01080D911F1}</a:tableStyleId>
+                <a:tableStyleId>{E3770140-DFBD-4176-9F24-717D573466D0}</a:tableStyleId>
               </a:tblPr>
               <a:tblGrid>
                 <a:gridCol w="3520600"/>
@@ -14652,7 +14652,7 @@
             </a:pPr>
             <a:r>
               <a:rPr lang="en"/>
-              <a:t>github.com/bhavink/adb4u</a:t>
+              <a:t>github.com/bhavink/databricks → adb4u</a:t>
             </a:r>
             <a:endParaRPr/>
           </a:p>

</xml_diff>